<commit_message>
Update analog voltage control circuit.pptx
</commit_message>
<xml_diff>
--- a/analog-voltage-control/analog voltage control circuit.pptx
+++ b/analog-voltage-control/analog voltage control circuit.pptx
@@ -216,7 +216,7 @@
           <a:p>
             <a:fld id="{67F8D55A-2761-4795-BBAA-A02A88EA5D2B}" type="datetimeFigureOut">
               <a:rPr lang="en-US" smtClean="0"/>
-              <a:t>2019-11-13</a:t>
+              <a:t>3/17/2020</a:t>
             </a:fld>
             <a:endParaRPr lang="en-US"/>
           </a:p>
@@ -381,7 +381,7 @@
           <a:p>
             <a:fld id="{5BE1B015-5AB2-4FAD-85D6-0F82D5B2E40D}" type="datetimeFigureOut">
               <a:rPr lang="en-US" smtClean="0"/>
-              <a:t>2019-11-13</a:t>
+              <a:t>3/17/2020</a:t>
             </a:fld>
             <a:endParaRPr lang="en-US"/>
           </a:p>
@@ -853,7 +853,7 @@
           <a:p>
             <a:fld id="{EEE428C5-A762-4CF1-BFEE-52FED224042C}" type="datetimeFigureOut">
               <a:rPr lang="en-US" smtClean="0"/>
-              <a:t>2019-11-13</a:t>
+              <a:t>3/17/2020</a:t>
             </a:fld>
             <a:endParaRPr lang="en-US"/>
           </a:p>
@@ -1063,7 +1063,7 @@
           <a:p>
             <a:fld id="{EEE428C5-A762-4CF1-BFEE-52FED224042C}" type="datetimeFigureOut">
               <a:rPr lang="en-US" smtClean="0"/>
-              <a:t>2019-11-13</a:t>
+              <a:t>3/17/2020</a:t>
             </a:fld>
             <a:endParaRPr lang="en-US"/>
           </a:p>
@@ -1273,7 +1273,7 @@
           <a:p>
             <a:fld id="{EEE428C5-A762-4CF1-BFEE-52FED224042C}" type="datetimeFigureOut">
               <a:rPr lang="en-US" smtClean="0"/>
-              <a:t>2019-11-13</a:t>
+              <a:t>3/17/2020</a:t>
             </a:fld>
             <a:endParaRPr lang="en-US"/>
           </a:p>
@@ -1483,7 +1483,7 @@
           <a:p>
             <a:fld id="{EEE428C5-A762-4CF1-BFEE-52FED224042C}" type="datetimeFigureOut">
               <a:rPr lang="en-US" smtClean="0"/>
-              <a:t>2019-11-13</a:t>
+              <a:t>3/17/2020</a:t>
             </a:fld>
             <a:endParaRPr lang="en-US"/>
           </a:p>
@@ -1757,7 +1757,7 @@
           <a:p>
             <a:fld id="{EEE428C5-A762-4CF1-BFEE-52FED224042C}" type="datetimeFigureOut">
               <a:rPr lang="en-US" smtClean="0"/>
-              <a:t>2019-11-13</a:t>
+              <a:t>3/17/2020</a:t>
             </a:fld>
             <a:endParaRPr lang="en-US"/>
           </a:p>
@@ -2027,7 +2027,7 @@
           <a:p>
             <a:fld id="{EEE428C5-A762-4CF1-BFEE-52FED224042C}" type="datetimeFigureOut">
               <a:rPr lang="en-US" smtClean="0"/>
-              <a:t>2019-11-13</a:t>
+              <a:t>3/17/2020</a:t>
             </a:fld>
             <a:endParaRPr lang="en-US"/>
           </a:p>
@@ -2433,7 +2433,7 @@
           <a:p>
             <a:fld id="{EEE428C5-A762-4CF1-BFEE-52FED224042C}" type="datetimeFigureOut">
               <a:rPr lang="en-US" smtClean="0"/>
-              <a:t>2019-11-13</a:t>
+              <a:t>3/17/2020</a:t>
             </a:fld>
             <a:endParaRPr lang="en-US"/>
           </a:p>
@@ -2583,7 +2583,7 @@
           <a:p>
             <a:fld id="{EEE428C5-A762-4CF1-BFEE-52FED224042C}" type="datetimeFigureOut">
               <a:rPr lang="en-US" smtClean="0"/>
-              <a:t>2019-11-13</a:t>
+              <a:t>3/17/2020</a:t>
             </a:fld>
             <a:endParaRPr lang="en-US"/>
           </a:p>
@@ -2702,7 +2702,7 @@
           <a:p>
             <a:fld id="{EEE428C5-A762-4CF1-BFEE-52FED224042C}" type="datetimeFigureOut">
               <a:rPr lang="en-US" smtClean="0"/>
-              <a:t>2019-11-13</a:t>
+              <a:t>3/17/2020</a:t>
             </a:fld>
             <a:endParaRPr lang="en-US"/>
           </a:p>
@@ -3012,7 +3012,7 @@
           <a:p>
             <a:fld id="{EEE428C5-A762-4CF1-BFEE-52FED224042C}" type="datetimeFigureOut">
               <a:rPr lang="en-US" smtClean="0"/>
-              <a:t>2019-11-13</a:t>
+              <a:t>3/17/2020</a:t>
             </a:fld>
             <a:endParaRPr lang="en-US"/>
           </a:p>
@@ -3302,7 +3302,7 @@
           <a:p>
             <a:fld id="{EEE428C5-A762-4CF1-BFEE-52FED224042C}" type="datetimeFigureOut">
               <a:rPr lang="en-US" smtClean="0"/>
-              <a:t>2019-11-13</a:t>
+              <a:t>3/17/2020</a:t>
             </a:fld>
             <a:endParaRPr lang="en-US"/>
           </a:p>
@@ -3930,8 +3930,8 @@
           </a:p>
         </p:txBody>
       </p:sp>
-      <mc:AlternateContent xmlns:mc="http://schemas.openxmlformats.org/markup-compatibility/2006">
-        <mc:Choice xmlns:a14="http://schemas.microsoft.com/office/drawing/2010/main" Requires="a14">
+      <mc:AlternateContent xmlns:mc="http://schemas.openxmlformats.org/markup-compatibility/2006" xmlns:a14="http://schemas.microsoft.com/office/drawing/2010/main">
+        <mc:Choice Requires="a14">
           <p:sp>
             <p:nvSpPr>
               <p:cNvPr id="7" name="TextBox 6">
@@ -4014,7 +4014,7 @@
             </p:txBody>
           </p:sp>
         </mc:Choice>
-        <mc:Fallback>
+        <mc:Fallback xmlns="">
           <p:sp>
             <p:nvSpPr>
               <p:cNvPr id="7" name="TextBox 6">
@@ -4126,18 +4126,28 @@
           <a:prstGeom prst="rect">
             <a:avLst/>
           </a:prstGeom>
+          <a:solidFill>
+            <a:schemeClr val="bg1">
+              <a:lumMod val="95000"/>
+            </a:schemeClr>
+          </a:solidFill>
+          <a:ln>
+            <a:solidFill>
+              <a:schemeClr val="tx1"/>
+            </a:solidFill>
+          </a:ln>
         </p:spPr>
         <p:style>
           <a:lnRef idx="2">
-            <a:schemeClr val="accent1">
+            <a:schemeClr val="accent3">
               <a:shade val="50000"/>
             </a:schemeClr>
           </a:lnRef>
           <a:fillRef idx="1">
-            <a:schemeClr val="accent1"/>
+            <a:schemeClr val="accent3"/>
           </a:fillRef>
           <a:effectRef idx="0">
-            <a:schemeClr val="accent1"/>
+            <a:schemeClr val="accent3"/>
           </a:effectRef>
           <a:fontRef idx="minor">
             <a:schemeClr val="lt1"/>
@@ -4149,7 +4159,11 @@
           <a:p>
             <a:pPr algn="ctr"/>
             <a:r>
-              <a:rPr lang="en-US" dirty="0"/>
+              <a:rPr lang="en-US" dirty="0">
+                <a:solidFill>
+                  <a:schemeClr val="tx1"/>
+                </a:solidFill>
+              </a:rPr>
               <a:t>Digital-to-Analog Converter (DAC)</a:t>
             </a:r>
           </a:p>
@@ -4272,7 +4286,16 @@
                           <a:rPr lang="en-US" b="0" i="0" smtClean="0">
                             <a:latin typeface="Cambria Math" panose="02040503050406030204" pitchFamily="18" charset="0"/>
                           </a:rPr>
-                          <m:t>out</m:t>
+                          <m:t>o</m:t>
+                        </m:r>
+                        <m:r>
+                          <m:rPr>
+                            <m:sty m:val="p"/>
+                          </m:rPr>
+                          <a:rPr lang="en-US" b="0" i="0" smtClean="0">
+                            <a:latin typeface="Cambria Math" panose="02040503050406030204" pitchFamily="18" charset="0"/>
+                          </a:rPr>
+                          <m:t>ut</m:t>
                         </m:r>
                       </m:sub>
                     </m:sSub>
@@ -4453,8 +4476,8 @@
           </a:fontRef>
         </p:style>
       </p:cxnSp>
-      <mc:AlternateContent xmlns:mc="http://schemas.openxmlformats.org/markup-compatibility/2006">
-        <mc:Choice xmlns:a14="http://schemas.microsoft.com/office/drawing/2010/main" Requires="a14">
+      <mc:AlternateContent xmlns:mc="http://schemas.openxmlformats.org/markup-compatibility/2006" xmlns:a14="http://schemas.microsoft.com/office/drawing/2010/main">
+        <mc:Choice Requires="a14">
           <p:sp>
             <p:nvSpPr>
               <p:cNvPr id="22" name="TextBox 21">
@@ -4535,7 +4558,7 @@
             </p:txBody>
           </p:sp>
         </mc:Choice>
-        <mc:Fallback>
+        <mc:Fallback xmlns="">
           <p:sp>
             <p:nvSpPr>
               <p:cNvPr id="22" name="TextBox 21">
@@ -4610,484 +4633,269 @@
           </a:prstGeom>
         </p:spPr>
       </p:pic>
-      <mc:AlternateContent xmlns:mc="http://schemas.openxmlformats.org/markup-compatibility/2006">
-        <mc:Choice xmlns:a14="http://schemas.microsoft.com/office/drawing/2010/main" Requires="a14">
-          <p:sp>
-            <p:nvSpPr>
-              <p:cNvPr id="16" name="TextBox 15">
-                <a:extLst>
-                  <a:ext uri="{FF2B5EF4-FFF2-40B4-BE49-F238E27FC236}">
-                    <a16:creationId xmlns:a16="http://schemas.microsoft.com/office/drawing/2014/main" id="{84078501-645A-422C-A488-20805AF7313D}"/>
-                  </a:ext>
-                </a:extLst>
-              </p:cNvPr>
-              <p:cNvSpPr txBox="1"/>
-              <p:nvPr/>
-            </p:nvSpPr>
-            <p:spPr>
-              <a:xfrm>
-                <a:off x="5445110" y="4208725"/>
-                <a:ext cx="628432" cy="369332"/>
-              </a:xfrm>
-              <a:prstGeom prst="rect">
-                <a:avLst/>
-              </a:prstGeom>
-              <a:noFill/>
-            </p:spPr>
-            <p:txBody>
-              <a:bodyPr wrap="square" rtlCol="0">
-                <a:spAutoFit/>
-              </a:bodyPr>
-              <a:lstStyle/>
-              <a:p>
-                <a:pPr/>
-                <a14:m>
-                  <m:oMathPara xmlns:m="http://schemas.openxmlformats.org/officeDocument/2006/math">
-                    <m:oMathParaPr>
-                      <m:jc m:val="centerGroup"/>
-                    </m:oMathParaPr>
-                    <m:oMath xmlns:m="http://schemas.openxmlformats.org/officeDocument/2006/math">
-                      <m:sSub>
-                        <m:sSubPr>
-                          <m:ctrlPr>
-                            <a:rPr lang="en-US" b="0" i="1" smtClean="0">
-                              <a:latin typeface="Cambria Math" panose="02040503050406030204" pitchFamily="18" charset="0"/>
-                            </a:rPr>
-                          </m:ctrlPr>
-                        </m:sSubPr>
-                        <m:e>
-                          <m:r>
-                            <a:rPr lang="en-US" b="0" i="1" smtClean="0">
-                              <a:latin typeface="Cambria Math" panose="02040503050406030204" pitchFamily="18" charset="0"/>
-                            </a:rPr>
-                            <m:t>𝑉</m:t>
-                          </m:r>
-                        </m:e>
-                        <m:sub>
-                          <m:r>
-                            <a:rPr lang="en-US" b="0" i="1" smtClean="0">
-                              <a:latin typeface="Cambria Math" panose="02040503050406030204" pitchFamily="18" charset="0"/>
-                            </a:rPr>
-                            <m:t>𝑜𝑢𝑡</m:t>
-                          </m:r>
-                        </m:sub>
-                      </m:sSub>
-                    </m:oMath>
-                  </m:oMathPara>
-                </a14:m>
-                <a:endParaRPr lang="en-US" dirty="0"/>
-              </a:p>
-            </p:txBody>
-          </p:sp>
-        </mc:Choice>
-        <mc:Fallback>
-          <p:sp>
-            <p:nvSpPr>
-              <p:cNvPr id="16" name="TextBox 15">
-                <a:extLst>
-                  <a:ext uri="{FF2B5EF4-FFF2-40B4-BE49-F238E27FC236}">
-                    <a16:creationId xmlns:a16="http://schemas.microsoft.com/office/drawing/2014/main" id="{84078501-645A-422C-A488-20805AF7313D}"/>
-                  </a:ext>
-                </a:extLst>
-              </p:cNvPr>
-              <p:cNvSpPr txBox="1">
-                <a:spLocks noRot="1" noChangeAspect="1" noMove="1" noResize="1" noEditPoints="1" noAdjustHandles="1" noChangeArrowheads="1" noChangeShapeType="1" noTextEdit="1"/>
-              </p:cNvSpPr>
-              <p:nvPr/>
-            </p:nvSpPr>
-            <p:spPr>
-              <a:xfrm>
-                <a:off x="5445110" y="4208725"/>
-                <a:ext cx="628432" cy="369332"/>
-              </a:xfrm>
-              <a:prstGeom prst="rect">
-                <a:avLst/>
-              </a:prstGeom>
-              <a:blipFill>
-                <a:blip r:embed="rId7"/>
-                <a:stretch>
-                  <a:fillRect/>
-                </a:stretch>
-              </a:blipFill>
-            </p:spPr>
-            <p:txBody>
-              <a:bodyPr/>
-              <a:lstStyle/>
-              <a:p>
-                <a:r>
-                  <a:rPr lang="en-US">
-                    <a:noFill/>
-                  </a:rPr>
-                  <a:t> </a:t>
-                </a:r>
-              </a:p>
-            </p:txBody>
-          </p:sp>
-        </mc:Fallback>
-      </mc:AlternateContent>
-      <mc:AlternateContent xmlns:mc="http://schemas.openxmlformats.org/markup-compatibility/2006">
-        <mc:Choice xmlns:a14="http://schemas.microsoft.com/office/drawing/2010/main" Requires="a14">
-          <p:sp>
-            <p:nvSpPr>
-              <p:cNvPr id="17" name="TextBox 16">
-                <a:extLst>
-                  <a:ext uri="{FF2B5EF4-FFF2-40B4-BE49-F238E27FC236}">
-                    <a16:creationId xmlns:a16="http://schemas.microsoft.com/office/drawing/2014/main" id="{A9065EBE-BC6A-4CBC-8CC0-BAAD74715F7A}"/>
-                  </a:ext>
-                </a:extLst>
-              </p:cNvPr>
-              <p:cNvSpPr txBox="1"/>
-              <p:nvPr/>
-            </p:nvSpPr>
-            <p:spPr>
-              <a:xfrm>
-                <a:off x="7067515" y="4208725"/>
-                <a:ext cx="628432" cy="369332"/>
-              </a:xfrm>
-              <a:prstGeom prst="rect">
-                <a:avLst/>
-              </a:prstGeom>
-              <a:noFill/>
-            </p:spPr>
-            <p:txBody>
-              <a:bodyPr wrap="square" rtlCol="0">
-                <a:spAutoFit/>
-              </a:bodyPr>
-              <a:lstStyle/>
-              <a:p>
-                <a:pPr/>
-                <a14:m>
-                  <m:oMathPara xmlns:m="http://schemas.openxmlformats.org/officeDocument/2006/math">
-                    <m:oMathParaPr>
-                      <m:jc m:val="centerGroup"/>
-                    </m:oMathParaPr>
-                    <m:oMath xmlns:m="http://schemas.openxmlformats.org/officeDocument/2006/math">
-                      <m:sSub>
-                        <m:sSubPr>
-                          <m:ctrlPr>
-                            <a:rPr lang="en-US" b="0" i="1" smtClean="0">
-                              <a:latin typeface="Cambria Math" panose="02040503050406030204" pitchFamily="18" charset="0"/>
-                            </a:rPr>
-                          </m:ctrlPr>
-                        </m:sSubPr>
-                        <m:e>
-                          <m:r>
-                            <a:rPr lang="en-US" b="0" i="1" smtClean="0">
-                              <a:latin typeface="Cambria Math" panose="02040503050406030204" pitchFamily="18" charset="0"/>
-                            </a:rPr>
-                            <m:t>𝑉</m:t>
-                          </m:r>
-                        </m:e>
-                        <m:sub>
-                          <m:r>
-                            <a:rPr lang="en-US" b="0" i="1" smtClean="0">
-                              <a:latin typeface="Cambria Math" panose="02040503050406030204" pitchFamily="18" charset="0"/>
-                            </a:rPr>
-                            <m:t>𝑜𝑢𝑡</m:t>
-                          </m:r>
-                        </m:sub>
-                      </m:sSub>
-                    </m:oMath>
-                  </m:oMathPara>
-                </a14:m>
-                <a:endParaRPr lang="en-US" dirty="0"/>
-              </a:p>
-            </p:txBody>
-          </p:sp>
-        </mc:Choice>
-        <mc:Fallback>
-          <p:sp>
-            <p:nvSpPr>
-              <p:cNvPr id="17" name="TextBox 16">
-                <a:extLst>
-                  <a:ext uri="{FF2B5EF4-FFF2-40B4-BE49-F238E27FC236}">
-                    <a16:creationId xmlns:a16="http://schemas.microsoft.com/office/drawing/2014/main" id="{A9065EBE-BC6A-4CBC-8CC0-BAAD74715F7A}"/>
-                  </a:ext>
-                </a:extLst>
-              </p:cNvPr>
-              <p:cNvSpPr txBox="1">
-                <a:spLocks noRot="1" noChangeAspect="1" noMove="1" noResize="1" noEditPoints="1" noAdjustHandles="1" noChangeArrowheads="1" noChangeShapeType="1" noTextEdit="1"/>
-              </p:cNvSpPr>
-              <p:nvPr/>
-            </p:nvSpPr>
-            <p:spPr>
-              <a:xfrm>
-                <a:off x="7067515" y="4208725"/>
-                <a:ext cx="628432" cy="369332"/>
-              </a:xfrm>
-              <a:prstGeom prst="rect">
-                <a:avLst/>
-              </a:prstGeom>
-              <a:blipFill>
-                <a:blip r:embed="rId8"/>
-                <a:stretch>
-                  <a:fillRect/>
-                </a:stretch>
-              </a:blipFill>
-            </p:spPr>
-            <p:txBody>
-              <a:bodyPr/>
-              <a:lstStyle/>
-              <a:p>
-                <a:r>
-                  <a:rPr lang="en-US">
-                    <a:noFill/>
-                  </a:rPr>
-                  <a:t> </a:t>
-                </a:r>
-              </a:p>
-            </p:txBody>
-          </p:sp>
-        </mc:Fallback>
-      </mc:AlternateContent>
-      <mc:AlternateContent xmlns:mc="http://schemas.openxmlformats.org/markup-compatibility/2006">
-        <mc:Choice xmlns:a14="http://schemas.microsoft.com/office/drawing/2010/main" Requires="a14">
-          <p:sp>
-            <p:nvSpPr>
-              <p:cNvPr id="19" name="TextBox 18">
-                <a:extLst>
-                  <a:ext uri="{FF2B5EF4-FFF2-40B4-BE49-F238E27FC236}">
-                    <a16:creationId xmlns:a16="http://schemas.microsoft.com/office/drawing/2014/main" id="{A86DCB74-3D52-44EC-BD6B-1C2D593E7B4F}"/>
-                  </a:ext>
-                </a:extLst>
-              </p:cNvPr>
-              <p:cNvSpPr txBox="1"/>
-              <p:nvPr/>
-            </p:nvSpPr>
-            <p:spPr>
-              <a:xfrm>
-                <a:off x="7067515" y="1444670"/>
-                <a:ext cx="1683344" cy="391582"/>
-              </a:xfrm>
-              <a:prstGeom prst="rect">
-                <a:avLst/>
-              </a:prstGeom>
-              <a:noFill/>
-            </p:spPr>
-            <p:txBody>
-              <a:bodyPr wrap="square" rtlCol="0">
-                <a:spAutoFit/>
-              </a:bodyPr>
-              <a:lstStyle/>
-              <a:p>
-                <a:pPr/>
-                <a14:m>
-                  <m:oMathPara xmlns:m="http://schemas.openxmlformats.org/officeDocument/2006/math">
-                    <m:oMathParaPr>
-                      <m:jc m:val="centerGroup"/>
-                    </m:oMathParaPr>
-                    <m:oMath xmlns:m="http://schemas.openxmlformats.org/officeDocument/2006/math">
-                      <m:sSub>
-                        <m:sSubPr>
-                          <m:ctrlPr>
-                            <a:rPr lang="en-US" b="0" i="1" smtClean="0">
-                              <a:latin typeface="Cambria Math" panose="02040503050406030204" pitchFamily="18" charset="0"/>
-                            </a:rPr>
-                          </m:ctrlPr>
-                        </m:sSubPr>
-                        <m:e>
-                          <m:r>
-                            <a:rPr lang="en-US" b="0" i="1" smtClean="0">
-                              <a:latin typeface="Cambria Math" panose="02040503050406030204" pitchFamily="18" charset="0"/>
-                            </a:rPr>
-                            <m:t>𝑉</m:t>
-                          </m:r>
-                        </m:e>
-                        <m:sub>
-                          <m:r>
-                            <a:rPr lang="en-US" b="0" i="1" smtClean="0">
-                              <a:latin typeface="Cambria Math" panose="02040503050406030204" pitchFamily="18" charset="0"/>
-                            </a:rPr>
-                            <m:t>𝑟𝑒𝑓</m:t>
-                          </m:r>
-                        </m:sub>
-                      </m:sSub>
-                      <m:r>
-                        <a:rPr lang="en-US" b="0" i="1" smtClean="0">
-                          <a:latin typeface="Cambria Math" panose="02040503050406030204" pitchFamily="18" charset="0"/>
-                        </a:rPr>
-                        <m:t>=4.096</m:t>
-                      </m:r>
-                    </m:oMath>
-                  </m:oMathPara>
-                </a14:m>
-                <a:endParaRPr lang="en-US" dirty="0"/>
-              </a:p>
-            </p:txBody>
-          </p:sp>
-        </mc:Choice>
-        <mc:Fallback>
-          <p:sp>
-            <p:nvSpPr>
-              <p:cNvPr id="19" name="TextBox 18">
-                <a:extLst>
-                  <a:ext uri="{FF2B5EF4-FFF2-40B4-BE49-F238E27FC236}">
-                    <a16:creationId xmlns:a16="http://schemas.microsoft.com/office/drawing/2014/main" id="{A86DCB74-3D52-44EC-BD6B-1C2D593E7B4F}"/>
-                  </a:ext>
-                </a:extLst>
-              </p:cNvPr>
-              <p:cNvSpPr txBox="1">
-                <a:spLocks noRot="1" noChangeAspect="1" noMove="1" noResize="1" noEditPoints="1" noAdjustHandles="1" noChangeArrowheads="1" noChangeShapeType="1" noTextEdit="1"/>
-              </p:cNvSpPr>
-              <p:nvPr/>
-            </p:nvSpPr>
-            <p:spPr>
-              <a:xfrm>
-                <a:off x="7067515" y="1444670"/>
-                <a:ext cx="1683344" cy="391582"/>
-              </a:xfrm>
-              <a:prstGeom prst="rect">
-                <a:avLst/>
-              </a:prstGeom>
-              <a:blipFill>
-                <a:blip r:embed="rId9"/>
-                <a:stretch>
-                  <a:fillRect b="-9375"/>
-                </a:stretch>
-              </a:blipFill>
-            </p:spPr>
-            <p:txBody>
-              <a:bodyPr/>
-              <a:lstStyle/>
-              <a:p>
-                <a:r>
-                  <a:rPr lang="en-US">
-                    <a:noFill/>
-                  </a:rPr>
-                  <a:t> </a:t>
-                </a:r>
-              </a:p>
-            </p:txBody>
-          </p:sp>
-        </mc:Fallback>
-      </mc:AlternateContent>
-      <mc:AlternateContent xmlns:mc="http://schemas.openxmlformats.org/markup-compatibility/2006">
-        <mc:Choice xmlns:a14="http://schemas.microsoft.com/office/drawing/2010/main" Requires="a14">
-          <p:sp>
-            <p:nvSpPr>
-              <p:cNvPr id="20" name="TextBox 19">
-                <a:extLst>
-                  <a:ext uri="{FF2B5EF4-FFF2-40B4-BE49-F238E27FC236}">
-                    <a16:creationId xmlns:a16="http://schemas.microsoft.com/office/drawing/2014/main" id="{D637AC9E-8ACE-4153-9E2F-D52BCCF7BAC8}"/>
-                  </a:ext>
-                </a:extLst>
-              </p:cNvPr>
-              <p:cNvSpPr txBox="1"/>
-              <p:nvPr/>
-            </p:nvSpPr>
-            <p:spPr>
-              <a:xfrm>
-                <a:off x="1135264" y="4115228"/>
-                <a:ext cx="1683344" cy="369332"/>
-              </a:xfrm>
-              <a:prstGeom prst="rect">
-                <a:avLst/>
-              </a:prstGeom>
-              <a:noFill/>
-            </p:spPr>
-            <p:txBody>
-              <a:bodyPr wrap="square" rtlCol="0">
-                <a:spAutoFit/>
-              </a:bodyPr>
-              <a:lstStyle/>
-              <a:p>
-                <a:pPr/>
-                <a14:m>
-                  <m:oMathPara xmlns:m="http://schemas.openxmlformats.org/officeDocument/2006/math">
-                    <m:oMathParaPr>
-                      <m:jc m:val="centerGroup"/>
-                    </m:oMathParaPr>
-                    <m:oMath xmlns:m="http://schemas.openxmlformats.org/officeDocument/2006/math">
-                      <m:sSub>
-                        <m:sSubPr>
-                          <m:ctrlPr>
-                            <a:rPr lang="en-US" b="0" i="1" smtClean="0">
-                              <a:latin typeface="Cambria Math" panose="02040503050406030204" pitchFamily="18" charset="0"/>
-                            </a:rPr>
-                          </m:ctrlPr>
-                        </m:sSubPr>
-                        <m:e>
-                          <m:r>
-                            <a:rPr lang="en-US" b="0" i="1" smtClean="0">
-                              <a:latin typeface="Cambria Math" panose="02040503050406030204" pitchFamily="18" charset="0"/>
-                            </a:rPr>
-                            <m:t>𝑉</m:t>
-                          </m:r>
-                        </m:e>
-                        <m:sub>
-                          <m:r>
-                            <a:rPr lang="en-US" b="0" i="1" smtClean="0">
-                              <a:latin typeface="Cambria Math" panose="02040503050406030204" pitchFamily="18" charset="0"/>
-                            </a:rPr>
-                            <m:t>𝐷𝐷</m:t>
-                          </m:r>
-                        </m:sub>
-                      </m:sSub>
-                      <m:r>
-                        <a:rPr lang="en-US" b="0" i="1" smtClean="0">
-                          <a:latin typeface="Cambria Math" panose="02040503050406030204" pitchFamily="18" charset="0"/>
-                        </a:rPr>
-                        <m:t>=3.3</m:t>
-                      </m:r>
-                      <m:r>
-                        <a:rPr lang="en-US" b="0" i="1" smtClean="0">
-                          <a:latin typeface="Cambria Math" panose="02040503050406030204" pitchFamily="18" charset="0"/>
-                        </a:rPr>
-                        <m:t>𝑉</m:t>
-                      </m:r>
-                    </m:oMath>
-                  </m:oMathPara>
-                </a14:m>
-                <a:endParaRPr lang="en-US" dirty="0"/>
-              </a:p>
-            </p:txBody>
-          </p:sp>
-        </mc:Choice>
-        <mc:Fallback>
-          <p:sp>
-            <p:nvSpPr>
-              <p:cNvPr id="20" name="TextBox 19">
-                <a:extLst>
-                  <a:ext uri="{FF2B5EF4-FFF2-40B4-BE49-F238E27FC236}">
-                    <a16:creationId xmlns:a16="http://schemas.microsoft.com/office/drawing/2014/main" id="{D637AC9E-8ACE-4153-9E2F-D52BCCF7BAC8}"/>
-                  </a:ext>
-                </a:extLst>
-              </p:cNvPr>
-              <p:cNvSpPr txBox="1">
-                <a:spLocks noRot="1" noChangeAspect="1" noMove="1" noResize="1" noEditPoints="1" noAdjustHandles="1" noChangeArrowheads="1" noChangeShapeType="1" noTextEdit="1"/>
-              </p:cNvSpPr>
-              <p:nvPr/>
-            </p:nvSpPr>
-            <p:spPr>
-              <a:xfrm>
-                <a:off x="1135264" y="4115228"/>
-                <a:ext cx="1683344" cy="369332"/>
-              </a:xfrm>
-              <a:prstGeom prst="rect">
-                <a:avLst/>
-              </a:prstGeom>
-              <a:blipFill>
-                <a:blip r:embed="rId10"/>
-                <a:stretch>
-                  <a:fillRect/>
-                </a:stretch>
-              </a:blipFill>
-            </p:spPr>
-            <p:txBody>
-              <a:bodyPr/>
-              <a:lstStyle/>
-              <a:p>
-                <a:r>
-                  <a:rPr lang="en-US">
-                    <a:noFill/>
-                  </a:rPr>
-                  <a:t> </a:t>
-                </a:r>
-              </a:p>
-            </p:txBody>
-          </p:sp>
-        </mc:Fallback>
-      </mc:AlternateContent>
+      <p:sp>
+        <p:nvSpPr>
+          <p:cNvPr id="16" name="TextBox 15">
+            <a:extLst>
+              <a:ext uri="{FF2B5EF4-FFF2-40B4-BE49-F238E27FC236}">
+                <a16:creationId xmlns:a16="http://schemas.microsoft.com/office/drawing/2014/main" id="{84078501-645A-422C-A488-20805AF7313D}"/>
+              </a:ext>
+            </a:extLst>
+          </p:cNvPr>
+          <p:cNvSpPr txBox="1"/>
+          <p:nvPr/>
+        </p:nvSpPr>
+        <p:spPr>
+          <a:xfrm>
+            <a:off x="5475590" y="4208725"/>
+            <a:ext cx="628432" cy="400110"/>
+          </a:xfrm>
+          <a:prstGeom prst="rect">
+            <a:avLst/>
+          </a:prstGeom>
+          <a:noFill/>
+        </p:spPr>
+        <p:txBody>
+          <a:bodyPr wrap="square" rtlCol="0">
+            <a:spAutoFit/>
+          </a:bodyPr>
+          <a:lstStyle/>
+          <a:p>
+            <a:pPr/>
+            <a:r>
+              <a:rPr lang="en-US" sz="2000" b="1" i="1" dirty="0" err="1">
+                <a:latin typeface="Times New Roman" panose="02020603050405020304" pitchFamily="18" charset="0"/>
+                <a:cs typeface="Times New Roman" panose="02020603050405020304" pitchFamily="18" charset="0"/>
+              </a:rPr>
+              <a:t>V</a:t>
+            </a:r>
+            <a:r>
+              <a:rPr lang="en-US" sz="2000" b="1" i="1" baseline="-25000" dirty="0" err="1">
+                <a:latin typeface="Times New Roman" panose="02020603050405020304" pitchFamily="18" charset="0"/>
+                <a:cs typeface="Times New Roman" panose="02020603050405020304" pitchFamily="18" charset="0"/>
+              </a:rPr>
+              <a:t>out</a:t>
+            </a:r>
+            <a:endParaRPr lang="en-US" sz="2000" b="1" i="1" dirty="0">
+              <a:latin typeface="Times New Roman" panose="02020603050405020304" pitchFamily="18" charset="0"/>
+              <a:cs typeface="Times New Roman" panose="02020603050405020304" pitchFamily="18" charset="0"/>
+            </a:endParaRPr>
+          </a:p>
+        </p:txBody>
+      </p:sp>
+      <p:sp>
+        <p:nvSpPr>
+          <p:cNvPr id="21" name="TextBox 20">
+            <a:extLst>
+              <a:ext uri="{FF2B5EF4-FFF2-40B4-BE49-F238E27FC236}">
+                <a16:creationId xmlns:a16="http://schemas.microsoft.com/office/drawing/2014/main" id="{0008B84C-AD6D-4C8C-B01F-E4F29143900E}"/>
+              </a:ext>
+            </a:extLst>
+          </p:cNvPr>
+          <p:cNvSpPr txBox="1"/>
+          <p:nvPr/>
+        </p:nvSpPr>
+        <p:spPr>
+          <a:xfrm>
+            <a:off x="7077937" y="4208725"/>
+            <a:ext cx="628432" cy="400110"/>
+          </a:xfrm>
+          <a:prstGeom prst="rect">
+            <a:avLst/>
+          </a:prstGeom>
+          <a:noFill/>
+        </p:spPr>
+        <p:txBody>
+          <a:bodyPr wrap="square" rtlCol="0">
+            <a:spAutoFit/>
+          </a:bodyPr>
+          <a:lstStyle/>
+          <a:p>
+            <a:pPr/>
+            <a:r>
+              <a:rPr lang="en-US" sz="2000" b="1" i="1" dirty="0" err="1">
+                <a:latin typeface="Times New Roman" panose="02020603050405020304" pitchFamily="18" charset="0"/>
+                <a:cs typeface="Times New Roman" panose="02020603050405020304" pitchFamily="18" charset="0"/>
+              </a:rPr>
+              <a:t>V</a:t>
+            </a:r>
+            <a:r>
+              <a:rPr lang="en-US" sz="2000" b="1" i="1" baseline="-25000" dirty="0" err="1">
+                <a:latin typeface="Times New Roman" panose="02020603050405020304" pitchFamily="18" charset="0"/>
+                <a:cs typeface="Times New Roman" panose="02020603050405020304" pitchFamily="18" charset="0"/>
+              </a:rPr>
+              <a:t>out</a:t>
+            </a:r>
+            <a:endParaRPr lang="en-US" sz="2000" b="1" i="1" dirty="0">
+              <a:latin typeface="Times New Roman" panose="02020603050405020304" pitchFamily="18" charset="0"/>
+              <a:cs typeface="Times New Roman" panose="02020603050405020304" pitchFamily="18" charset="0"/>
+            </a:endParaRPr>
+          </a:p>
+        </p:txBody>
+      </p:sp>
+      <p:sp>
+        <p:nvSpPr>
+          <p:cNvPr id="23" name="TextBox 22">
+            <a:extLst>
+              <a:ext uri="{FF2B5EF4-FFF2-40B4-BE49-F238E27FC236}">
+                <a16:creationId xmlns:a16="http://schemas.microsoft.com/office/drawing/2014/main" id="{F603BC85-C1A3-4F67-B555-918ABEA46CD6}"/>
+              </a:ext>
+            </a:extLst>
+          </p:cNvPr>
+          <p:cNvSpPr txBox="1"/>
+          <p:nvPr/>
+        </p:nvSpPr>
+        <p:spPr>
+          <a:xfrm>
+            <a:off x="7199354" y="1420188"/>
+            <a:ext cx="1771926" cy="400110"/>
+          </a:xfrm>
+          <a:prstGeom prst="rect">
+            <a:avLst/>
+          </a:prstGeom>
+          <a:noFill/>
+        </p:spPr>
+        <p:txBody>
+          <a:bodyPr wrap="square" rtlCol="0">
+            <a:spAutoFit/>
+          </a:bodyPr>
+          <a:lstStyle/>
+          <a:p>
+            <a:pPr/>
+            <a:r>
+              <a:rPr lang="en-US" sz="2000" b="1" i="1" dirty="0" err="1">
+                <a:latin typeface="Times New Roman" panose="02020603050405020304" pitchFamily="18" charset="0"/>
+                <a:cs typeface="Times New Roman" panose="02020603050405020304" pitchFamily="18" charset="0"/>
+              </a:rPr>
+              <a:t>V</a:t>
+            </a:r>
+            <a:r>
+              <a:rPr lang="en-US" sz="2000" b="1" i="1" baseline="-25000" dirty="0" err="1">
+                <a:latin typeface="Times New Roman" panose="02020603050405020304" pitchFamily="18" charset="0"/>
+                <a:cs typeface="Times New Roman" panose="02020603050405020304" pitchFamily="18" charset="0"/>
+              </a:rPr>
+              <a:t>ref</a:t>
+            </a:r>
+            <a:r>
+              <a:rPr lang="en-US" sz="2000" b="1" i="1" baseline="-25000" dirty="0">
+                <a:latin typeface="Times New Roman" panose="02020603050405020304" pitchFamily="18" charset="0"/>
+                <a:cs typeface="Times New Roman" panose="02020603050405020304" pitchFamily="18" charset="0"/>
+              </a:rPr>
+              <a:t>  </a:t>
+            </a:r>
+            <a:r>
+              <a:rPr lang="en-US" sz="2000" b="1" dirty="0">
+                <a:latin typeface="Times New Roman" panose="02020603050405020304" pitchFamily="18" charset="0"/>
+                <a:cs typeface="Times New Roman" panose="02020603050405020304" pitchFamily="18" charset="0"/>
+              </a:rPr>
+              <a:t>= 4.096 V</a:t>
+            </a:r>
+            <a:r>
+              <a:rPr lang="en-US" sz="2000" b="1" baseline="-25000" dirty="0">
+                <a:latin typeface="Times New Roman" panose="02020603050405020304" pitchFamily="18" charset="0"/>
+                <a:cs typeface="Times New Roman" panose="02020603050405020304" pitchFamily="18" charset="0"/>
+              </a:rPr>
+              <a:t> </a:t>
+            </a:r>
+            <a:endParaRPr lang="en-US" sz="2000" b="1" dirty="0">
+              <a:latin typeface="Times New Roman" panose="02020603050405020304" pitchFamily="18" charset="0"/>
+              <a:cs typeface="Times New Roman" panose="02020603050405020304" pitchFamily="18" charset="0"/>
+            </a:endParaRPr>
+          </a:p>
+        </p:txBody>
+      </p:sp>
+      <p:sp>
+        <p:nvSpPr>
+          <p:cNvPr id="24" name="TextBox 23">
+            <a:extLst>
+              <a:ext uri="{FF2B5EF4-FFF2-40B4-BE49-F238E27FC236}">
+                <a16:creationId xmlns:a16="http://schemas.microsoft.com/office/drawing/2014/main" id="{312AD5A1-E2BD-463F-999D-1F21264E84F2}"/>
+              </a:ext>
+            </a:extLst>
+          </p:cNvPr>
+          <p:cNvSpPr txBox="1"/>
+          <p:nvPr/>
+        </p:nvSpPr>
+        <p:spPr>
+          <a:xfrm>
+            <a:off x="1337436" y="4195874"/>
+            <a:ext cx="1771926" cy="400110"/>
+          </a:xfrm>
+          <a:prstGeom prst="rect">
+            <a:avLst/>
+          </a:prstGeom>
+          <a:noFill/>
+        </p:spPr>
+        <p:txBody>
+          <a:bodyPr wrap="square" rtlCol="0">
+            <a:spAutoFit/>
+          </a:bodyPr>
+          <a:lstStyle/>
+          <a:p>
+            <a:pPr/>
+            <a:r>
+              <a:rPr lang="en-US" sz="2000" b="1" i="1" dirty="0">
+                <a:latin typeface="Times New Roman" panose="02020603050405020304" pitchFamily="18" charset="0"/>
+                <a:cs typeface="Times New Roman" panose="02020603050405020304" pitchFamily="18" charset="0"/>
+              </a:rPr>
+              <a:t>V</a:t>
+            </a:r>
+            <a:r>
+              <a:rPr lang="en-US" sz="2000" b="1" i="1" baseline="-25000" dirty="0">
+                <a:latin typeface="Times New Roman" panose="02020603050405020304" pitchFamily="18" charset="0"/>
+                <a:cs typeface="Times New Roman" panose="02020603050405020304" pitchFamily="18" charset="0"/>
+              </a:rPr>
+              <a:t>DD  </a:t>
+            </a:r>
+            <a:r>
+              <a:rPr lang="en-US" sz="2000" b="1" dirty="0">
+                <a:latin typeface="Times New Roman" panose="02020603050405020304" pitchFamily="18" charset="0"/>
+                <a:cs typeface="Times New Roman" panose="02020603050405020304" pitchFamily="18" charset="0"/>
+              </a:rPr>
+              <a:t>= 3.3 V</a:t>
+            </a:r>
+          </a:p>
+        </p:txBody>
+      </p:sp>
+      <p:cxnSp>
+        <p:nvCxnSpPr>
+          <p:cNvPr id="4" name="Straight Connector 3">
+            <a:extLst>
+              <a:ext uri="{FF2B5EF4-FFF2-40B4-BE49-F238E27FC236}">
+                <a16:creationId xmlns:a16="http://schemas.microsoft.com/office/drawing/2014/main" id="{1A02CB34-5EA5-469B-95BE-8110C4D17CF1}"/>
+              </a:ext>
+            </a:extLst>
+          </p:cNvPr>
+          <p:cNvCxnSpPr>
+            <a:cxnSpLocks/>
+          </p:cNvCxnSpPr>
+          <p:nvPr/>
+        </p:nvCxnSpPr>
+        <p:spPr>
+          <a:xfrm>
+            <a:off x="2133600" y="3850640"/>
+            <a:ext cx="0" cy="358085"/>
+          </a:xfrm>
+          <a:prstGeom prst="line">
+            <a:avLst/>
+          </a:prstGeom>
+          <a:ln w="28575"/>
+        </p:spPr>
+        <p:style>
+          <a:lnRef idx="1">
+            <a:schemeClr val="accent1"/>
+          </a:lnRef>
+          <a:fillRef idx="0">
+            <a:schemeClr val="accent1"/>
+          </a:fillRef>
+          <a:effectRef idx="0">
+            <a:schemeClr val="accent1"/>
+          </a:effectRef>
+          <a:fontRef idx="minor">
+            <a:schemeClr val="tx1"/>
+          </a:fontRef>
+        </p:style>
+      </p:cxnSp>
     </p:spTree>
     <p:extLst>
       <p:ext uri="{BB962C8B-B14F-4D97-AF65-F5344CB8AC3E}">

</xml_diff>